<commit_message>
to check randoms distributions
</commit_message>
<xml_diff>
--- a/Figures/Spatial and Temporal Resource Selection_ 2.pptx
+++ b/Figures/Spatial and Temporal Resource Selection_ 2.pptx
@@ -110,6 +110,11 @@
       </a:defRPr>
     </a:lvl9pPr>
   </p:defaultTextStyle>
+  <p:extLst>
+    <p:ext uri="{EFAFB233-063F-42B5-8137-9DF3F51BA10A}">
+      <p15:sldGuideLst xmlns:p15="http://schemas.microsoft.com/office/powerpoint/2012/main"/>
+    </p:ext>
+  </p:extLst>
 </p:presentation>
 </file>
 
@@ -244,7 +249,7 @@
           <a:p>
             <a:fld id="{1FB5A166-111A-442E-95ED-540E6F7849BE}" type="datetimeFigureOut">
               <a:rPr lang="en-US" smtClean="0"/>
-              <a:t>1/25/2024</a:t>
+              <a:t>1/29/2024</a:t>
             </a:fld>
             <a:endParaRPr lang="en-US"/>
           </a:p>
@@ -414,7 +419,7 @@
           <a:p>
             <a:fld id="{1FB5A166-111A-442E-95ED-540E6F7849BE}" type="datetimeFigureOut">
               <a:rPr lang="en-US" smtClean="0"/>
-              <a:t>1/25/2024</a:t>
+              <a:t>1/29/2024</a:t>
             </a:fld>
             <a:endParaRPr lang="en-US"/>
           </a:p>
@@ -594,7 +599,7 @@
           <a:p>
             <a:fld id="{1FB5A166-111A-442E-95ED-540E6F7849BE}" type="datetimeFigureOut">
               <a:rPr lang="en-US" smtClean="0"/>
-              <a:t>1/25/2024</a:t>
+              <a:t>1/29/2024</a:t>
             </a:fld>
             <a:endParaRPr lang="en-US"/>
           </a:p>
@@ -764,7 +769,7 @@
           <a:p>
             <a:fld id="{1FB5A166-111A-442E-95ED-540E6F7849BE}" type="datetimeFigureOut">
               <a:rPr lang="en-US" smtClean="0"/>
-              <a:t>1/25/2024</a:t>
+              <a:t>1/29/2024</a:t>
             </a:fld>
             <a:endParaRPr lang="en-US"/>
           </a:p>
@@ -1010,7 +1015,7 @@
           <a:p>
             <a:fld id="{1FB5A166-111A-442E-95ED-540E6F7849BE}" type="datetimeFigureOut">
               <a:rPr lang="en-US" smtClean="0"/>
-              <a:t>1/25/2024</a:t>
+              <a:t>1/29/2024</a:t>
             </a:fld>
             <a:endParaRPr lang="en-US"/>
           </a:p>
@@ -1242,7 +1247,7 @@
           <a:p>
             <a:fld id="{1FB5A166-111A-442E-95ED-540E6F7849BE}" type="datetimeFigureOut">
               <a:rPr lang="en-US" smtClean="0"/>
-              <a:t>1/25/2024</a:t>
+              <a:t>1/29/2024</a:t>
             </a:fld>
             <a:endParaRPr lang="en-US"/>
           </a:p>
@@ -1609,7 +1614,7 @@
           <a:p>
             <a:fld id="{1FB5A166-111A-442E-95ED-540E6F7849BE}" type="datetimeFigureOut">
               <a:rPr lang="en-US" smtClean="0"/>
-              <a:t>1/25/2024</a:t>
+              <a:t>1/29/2024</a:t>
             </a:fld>
             <a:endParaRPr lang="en-US"/>
           </a:p>
@@ -1727,7 +1732,7 @@
           <a:p>
             <a:fld id="{1FB5A166-111A-442E-95ED-540E6F7849BE}" type="datetimeFigureOut">
               <a:rPr lang="en-US" smtClean="0"/>
-              <a:t>1/25/2024</a:t>
+              <a:t>1/29/2024</a:t>
             </a:fld>
             <a:endParaRPr lang="en-US"/>
           </a:p>
@@ -1822,7 +1827,7 @@
           <a:p>
             <a:fld id="{1FB5A166-111A-442E-95ED-540E6F7849BE}" type="datetimeFigureOut">
               <a:rPr lang="en-US" smtClean="0"/>
-              <a:t>1/25/2024</a:t>
+              <a:t>1/29/2024</a:t>
             </a:fld>
             <a:endParaRPr lang="en-US"/>
           </a:p>
@@ -2099,7 +2104,7 @@
           <a:p>
             <a:fld id="{1FB5A166-111A-442E-95ED-540E6F7849BE}" type="datetimeFigureOut">
               <a:rPr lang="en-US" smtClean="0"/>
-              <a:t>1/25/2024</a:t>
+              <a:t>1/29/2024</a:t>
             </a:fld>
             <a:endParaRPr lang="en-US"/>
           </a:p>
@@ -2352,7 +2357,7 @@
           <a:p>
             <a:fld id="{1FB5A166-111A-442E-95ED-540E6F7849BE}" type="datetimeFigureOut">
               <a:rPr lang="en-US" smtClean="0"/>
-              <a:t>1/25/2024</a:t>
+              <a:t>1/29/2024</a:t>
             </a:fld>
             <a:endParaRPr lang="en-US"/>
           </a:p>
@@ -2565,7 +2570,7 @@
           <a:p>
             <a:fld id="{1FB5A166-111A-442E-95ED-540E6F7849BE}" type="datetimeFigureOut">
               <a:rPr lang="en-US" smtClean="0"/>
-              <a:t>1/25/2024</a:t>
+              <a:t>1/29/2024</a:t>
             </a:fld>
             <a:endParaRPr lang="en-US"/>
           </a:p>
@@ -4018,50 +4023,6 @@
       </p:sp>
       <p:sp>
         <p:nvSpPr>
-          <p:cNvPr id="14" name="TextBox 13"/>
-          <p:cNvSpPr txBox="1"/>
-          <p:nvPr/>
-        </p:nvSpPr>
-        <p:spPr>
-          <a:xfrm>
-            <a:off x="4912272" y="1432519"/>
-            <a:ext cx="5302555" cy="1200329"/>
-          </a:xfrm>
-          <a:prstGeom prst="rect">
-            <a:avLst/>
-          </a:prstGeom>
-          <a:solidFill>
-            <a:schemeClr val="bg2"/>
-          </a:solidFill>
-          <a:ln>
-            <a:solidFill>
-              <a:schemeClr val="tx1"/>
-            </a:solidFill>
-          </a:ln>
-        </p:spPr>
-        <p:txBody>
-          <a:bodyPr wrap="square" rtlCol="0">
-            <a:spAutoFit/>
-          </a:bodyPr>
-          <a:lstStyle/>
-          <a:p>
-            <a:r>
-              <a:rPr lang="en-US" dirty="0" smtClean="0"/>
-              <a:t>Differences: birds strongly select to be closer to roads at a course and property level, and although they still select for it at the </a:t>
-            </a:r>
-            <a:r>
-              <a:rPr lang="en-US" dirty="0" err="1" smtClean="0"/>
-              <a:t>homerange</a:t>
-            </a:r>
-            <a:r>
-              <a:rPr lang="en-US" dirty="0" smtClean="0"/>
-              <a:t> level it is not nearly to the same magnitude </a:t>
-            </a:r>
-          </a:p>
-        </p:txBody>
-      </p:sp>
-      <p:sp>
-        <p:nvSpPr>
           <p:cNvPr id="15" name="Oval 14"/>
           <p:cNvSpPr/>
           <p:nvPr/>
@@ -4138,8 +4099,8 @@
         </p:nvSpPr>
         <p:spPr>
           <a:xfrm>
-            <a:off x="409085" y="1536758"/>
-            <a:ext cx="3804231" cy="369332"/>
+            <a:off x="1000098" y="1300334"/>
+            <a:ext cx="3804231" cy="646331"/>
           </a:xfrm>
           <a:prstGeom prst="rect">
             <a:avLst/>
@@ -4161,7 +4122,19 @@
           <a:p>
             <a:r>
               <a:rPr lang="en-US" dirty="0" smtClean="0"/>
-              <a:t>Matters most in the breeding season </a:t>
+              <a:t>Grassy, </a:t>
+            </a:r>
+            <a:r>
+              <a:rPr lang="en-US" dirty="0" err="1" smtClean="0"/>
+              <a:t>ndvi</a:t>
+            </a:r>
+            <a:r>
+              <a:rPr lang="en-US" dirty="0" smtClean="0"/>
+              <a:t>, bf Matter </a:t>
+            </a:r>
+            <a:r>
+              <a:rPr lang="en-US" dirty="0" smtClean="0"/>
+              <a:t>most in the breeding season </a:t>
             </a:r>
           </a:p>
         </p:txBody>
@@ -4174,8 +4147,8 @@
         </p:nvCxnSpPr>
         <p:spPr>
           <a:xfrm flipH="1">
-            <a:off x="2625737" y="1966532"/>
-            <a:ext cx="348998" cy="570980"/>
+            <a:off x="2060285" y="1966532"/>
+            <a:ext cx="914450" cy="402829"/>
           </a:xfrm>
           <a:prstGeom prst="straightConnector1">
             <a:avLst/>
@@ -4282,8 +4255,8 @@
         </p:nvSpPr>
         <p:spPr>
           <a:xfrm>
-            <a:off x="3959703" y="5655675"/>
-            <a:ext cx="4223802" cy="369332"/>
+            <a:off x="6073049" y="5820477"/>
+            <a:ext cx="4141778" cy="338554"/>
           </a:xfrm>
           <a:prstGeom prst="rect">
             <a:avLst/>
@@ -4304,8 +4277,12 @@
           <a:lstStyle/>
           <a:p>
             <a:r>
-              <a:rPr lang="en-US" dirty="0" smtClean="0"/>
-              <a:t>Matters most in the non-breeding season </a:t>
+              <a:rPr lang="en-US" sz="1600" dirty="0" smtClean="0"/>
+              <a:t>Roads Matter </a:t>
+            </a:r>
+            <a:r>
+              <a:rPr lang="en-US" sz="1600" dirty="0" smtClean="0"/>
+              <a:t>most in the non-breeding season </a:t>
             </a:r>
           </a:p>
         </p:txBody>
@@ -4346,6 +4323,118 @@
           </a:fontRef>
         </p:style>
       </p:cxnSp>
+      <p:sp>
+        <p:nvSpPr>
+          <p:cNvPr id="22" name="TextBox 21"/>
+          <p:cNvSpPr txBox="1"/>
+          <p:nvPr/>
+        </p:nvSpPr>
+        <p:spPr>
+          <a:xfrm>
+            <a:off x="5816394" y="1369627"/>
+            <a:ext cx="4398433" cy="923330"/>
+          </a:xfrm>
+          <a:prstGeom prst="rect">
+            <a:avLst/>
+          </a:prstGeom>
+          <a:solidFill>
+            <a:schemeClr val="bg2"/>
+          </a:solidFill>
+          <a:ln>
+            <a:solidFill>
+              <a:schemeClr val="tx1"/>
+            </a:solidFill>
+          </a:ln>
+        </p:spPr>
+        <p:txBody>
+          <a:bodyPr wrap="square" rtlCol="0">
+            <a:spAutoFit/>
+          </a:bodyPr>
+          <a:lstStyle/>
+          <a:p>
+            <a:r>
+              <a:rPr lang="en-US" dirty="0" smtClean="0"/>
+              <a:t>Noticed Differences: At the </a:t>
+            </a:r>
+            <a:r>
+              <a:rPr lang="en-US" dirty="0" err="1" smtClean="0"/>
+              <a:t>homerange</a:t>
+            </a:r>
+            <a:r>
+              <a:rPr lang="en-US" dirty="0" smtClean="0"/>
+              <a:t> level, the magnitude of effect of roads is less than the other spatial levels </a:t>
+            </a:r>
+          </a:p>
+        </p:txBody>
+      </p:sp>
+      <p:sp>
+        <p:nvSpPr>
+          <p:cNvPr id="23" name="Left-Right Arrow 22"/>
+          <p:cNvSpPr/>
+          <p:nvPr/>
+        </p:nvSpPr>
+        <p:spPr>
+          <a:xfrm>
+            <a:off x="4379712" y="3037147"/>
+            <a:ext cx="1581059" cy="291049"/>
+          </a:xfrm>
+          <a:prstGeom prst="leftRightArrow">
+            <a:avLst/>
+          </a:prstGeom>
+        </p:spPr>
+        <p:style>
+          <a:lnRef idx="2">
+            <a:schemeClr val="accent2">
+              <a:shade val="50000"/>
+            </a:schemeClr>
+          </a:lnRef>
+          <a:fillRef idx="1">
+            <a:schemeClr val="accent2"/>
+          </a:fillRef>
+          <a:effectRef idx="0">
+            <a:schemeClr val="accent2"/>
+          </a:effectRef>
+          <a:fontRef idx="minor">
+            <a:schemeClr val="lt1"/>
+          </a:fontRef>
+        </p:style>
+        <p:txBody>
+          <a:bodyPr rtlCol="0" anchor="ctr"/>
+          <a:lstStyle/>
+          <a:p>
+            <a:pPr algn="ctr"/>
+            <a:r>
+              <a:rPr lang="en-US" sz="800" dirty="0" smtClean="0">
+                <a:ln w="0"/>
+                <a:solidFill>
+                  <a:schemeClr val="tx1"/>
+                </a:solidFill>
+                <a:effectLst>
+                  <a:outerShdw blurRad="38100" dist="19050" dir="2700000" algn="tl" rotWithShape="0">
+                    <a:schemeClr val="dk1">
+                      <a:alpha val="40000"/>
+                    </a:schemeClr>
+                  </a:outerShdw>
+                </a:effectLst>
+              </a:rPr>
+              <a:t>Same Magnitude of effect </a:t>
+            </a:r>
+            <a:endParaRPr lang="en-US" sz="800" dirty="0">
+              <a:ln w="0"/>
+              <a:solidFill>
+                <a:schemeClr val="tx1"/>
+              </a:solidFill>
+              <a:effectLst>
+                <a:outerShdw blurRad="38100" dist="19050" dir="2700000" algn="tl" rotWithShape="0">
+                  <a:schemeClr val="dk1">
+                    <a:alpha val="40000"/>
+                  </a:schemeClr>
+                </a:outerShdw>
+              </a:effectLst>
+            </a:endParaRPr>
+          </a:p>
+        </p:txBody>
+      </p:sp>
     </p:spTree>
     <p:extLst>
       <p:ext uri="{BB962C8B-B14F-4D97-AF65-F5344CB8AC3E}">
@@ -4403,39 +4492,21 @@
                                   </p:childTnLst>
                                 </p:cTn>
                               </p:par>
-                            </p:childTnLst>
-                          </p:cTn>
-                        </p:par>
-                      </p:childTnLst>
-                    </p:cTn>
-                  </p:par>
-                  <p:par>
-                    <p:cTn id="7" fill="hold">
-                      <p:stCondLst>
-                        <p:cond delay="indefinite"/>
-                      </p:stCondLst>
-                      <p:childTnLst>
-                        <p:par>
-                          <p:cTn id="8" fill="hold">
-                            <p:stCondLst>
-                              <p:cond delay="0"/>
-                            </p:stCondLst>
-                            <p:childTnLst>
                               <p:par>
-                                <p:cTn id="9" presetID="1" presetClass="entr" presetSubtype="0" fill="hold" grpId="0" nodeType="clickEffect">
+                                <p:cTn id="7" presetID="1" presetClass="entr" presetSubtype="0" fill="hold" grpId="0" nodeType="withEffect">
                                   <p:stCondLst>
                                     <p:cond delay="0"/>
                                   </p:stCondLst>
                                   <p:childTnLst>
                                     <p:set>
                                       <p:cBhvr>
-                                        <p:cTn id="10" dur="1" fill="hold">
+                                        <p:cTn id="8" dur="1" fill="hold">
                                           <p:stCondLst>
                                             <p:cond delay="0"/>
                                           </p:stCondLst>
                                         </p:cTn>
                                         <p:tgtEl>
-                                          <p:spTgt spid="15"/>
+                                          <p:spTgt spid="22"/>
                                         </p:tgtEl>
                                         <p:attrNameLst>
                                           <p:attrName>style.visibility</p:attrName>
@@ -4448,8 +4519,26 @@
                                   </p:childTnLst>
                                 </p:cTn>
                               </p:par>
+                            </p:childTnLst>
+                          </p:cTn>
+                        </p:par>
+                      </p:childTnLst>
+                    </p:cTn>
+                  </p:par>
+                  <p:par>
+                    <p:cTn id="9" fill="hold">
+                      <p:stCondLst>
+                        <p:cond delay="indefinite"/>
+                      </p:stCondLst>
+                      <p:childTnLst>
+                        <p:par>
+                          <p:cTn id="10" fill="hold">
+                            <p:stCondLst>
+                              <p:cond delay="0"/>
+                            </p:stCondLst>
+                            <p:childTnLst>
                               <p:par>
-                                <p:cTn id="11" presetID="1" presetClass="entr" presetSubtype="0" fill="hold" grpId="0" nodeType="withEffect">
+                                <p:cTn id="11" presetID="1" presetClass="entr" presetSubtype="0" fill="hold" grpId="0" nodeType="clickEffect">
                                   <p:stCondLst>
                                     <p:cond delay="0"/>
                                   </p:stCondLst>
@@ -4462,7 +4551,7 @@
                                           </p:stCondLst>
                                         </p:cTn>
                                         <p:tgtEl>
-                                          <p:spTgt spid="14"/>
+                                          <p:spTgt spid="15"/>
                                         </p:tgtEl>
                                         <p:attrNameLst>
                                           <p:attrName>style.visibility</p:attrName>
@@ -4534,7 +4623,7 @@
                                           </p:stCondLst>
                                         </p:cTn>
                                         <p:tgtEl>
-                                          <p:spTgt spid="24"/>
+                                          <p:spTgt spid="19"/>
                                         </p:tgtEl>
                                         <p:attrNameLst>
                                           <p:attrName>style.visibility</p:attrName>
@@ -4588,7 +4677,7 @@
                                           </p:stCondLst>
                                         </p:cTn>
                                         <p:tgtEl>
-                                          <p:spTgt spid="19"/>
+                                          <p:spTgt spid="24"/>
                                         </p:tgtEl>
                                         <p:attrNameLst>
                                           <p:attrName>style.visibility</p:attrName>
@@ -4633,6 +4722,51 @@
                                           </p:stCondLst>
                                         </p:cTn>
                                         <p:tgtEl>
+                                          <p:spTgt spid="23"/>
+                                        </p:tgtEl>
+                                        <p:attrNameLst>
+                                          <p:attrName>style.visibility</p:attrName>
+                                        </p:attrNameLst>
+                                      </p:cBhvr>
+                                      <p:to>
+                                        <p:strVal val="visible"/>
+                                      </p:to>
+                                    </p:set>
+                                  </p:childTnLst>
+                                </p:cTn>
+                              </p:par>
+                            </p:childTnLst>
+                          </p:cTn>
+                        </p:par>
+                      </p:childTnLst>
+                    </p:cTn>
+                  </p:par>
+                  <p:par>
+                    <p:cTn id="27" fill="hold">
+                      <p:stCondLst>
+                        <p:cond delay="indefinite"/>
+                      </p:stCondLst>
+                      <p:childTnLst>
+                        <p:par>
+                          <p:cTn id="28" fill="hold">
+                            <p:stCondLst>
+                              <p:cond delay="0"/>
+                            </p:stCondLst>
+                            <p:childTnLst>
+                              <p:par>
+                                <p:cTn id="29" presetID="1" presetClass="entr" presetSubtype="0" fill="hold" grpId="0" nodeType="clickEffect">
+                                  <p:stCondLst>
+                                    <p:cond delay="0"/>
+                                  </p:stCondLst>
+                                  <p:childTnLst>
+                                    <p:set>
+                                      <p:cBhvr>
+                                        <p:cTn id="30" dur="1" fill="hold">
+                                          <p:stCondLst>
+                                            <p:cond delay="0"/>
+                                          </p:stCondLst>
+                                        </p:cTn>
+                                        <p:tgtEl>
                                           <p:spTgt spid="33"/>
                                         </p:tgtEl>
                                         <p:attrNameLst>
@@ -4647,14 +4781,14 @@
                                 </p:cTn>
                               </p:par>
                               <p:par>
-                                <p:cTn id="27" presetID="1" presetClass="entr" presetSubtype="0" fill="hold" nodeType="withEffect">
+                                <p:cTn id="31" presetID="1" presetClass="entr" presetSubtype="0" fill="hold" nodeType="withEffect">
                                   <p:stCondLst>
                                     <p:cond delay="0"/>
                                   </p:stCondLst>
                                   <p:childTnLst>
                                     <p:set>
                                       <p:cBhvr>
-                                        <p:cTn id="28" dur="1" fill="hold">
+                                        <p:cTn id="32" dur="1" fill="hold">
                                           <p:stCondLst>
                                             <p:cond delay="0"/>
                                           </p:stCondLst>
@@ -4702,10 +4836,11 @@
     </p:tnLst>
     <p:bldLst>
       <p:bldP spid="13" grpId="0" animBg="1"/>
-      <p:bldP spid="14" grpId="0" animBg="1"/>
       <p:bldP spid="15" grpId="0" animBg="1"/>
       <p:bldP spid="17" grpId="0" animBg="1"/>
       <p:bldP spid="33" grpId="0" animBg="1"/>
+      <p:bldP spid="22" grpId="0" animBg="1"/>
+      <p:bldP spid="23" grpId="0" animBg="1"/>
     </p:bldLst>
   </p:timing>
 </p:sld>
@@ -4730,7 +4865,7 @@
       </p:grpSpPr>
       <p:pic>
         <p:nvPicPr>
-          <p:cNvPr id="4" name="Picture 3"/>
+          <p:cNvPr id="13" name="Picture 12"/>
           <p:cNvPicPr>
             <a:picLocks noChangeAspect="1"/>
           </p:cNvPicPr>
@@ -4754,13 +4889,13 @@
               </a:ext>
             </a:extLst>
           </a:blip>
-          <a:srcRect l="4901" r="18295" b="9805"/>
+          <a:srcRect r="19793"/>
           <a:stretch/>
         </p:blipFill>
         <p:spPr>
           <a:xfrm>
-            <a:off x="635000" y="1153564"/>
-            <a:ext cx="9633313" cy="5130799"/>
+            <a:off x="0" y="1153983"/>
+            <a:ext cx="10293713" cy="5704017"/>
           </a:xfrm>
           <a:prstGeom prst="rect">
             <a:avLst/>
@@ -4769,7 +4904,7 @@
       </p:pic>
       <p:pic>
         <p:nvPicPr>
-          <p:cNvPr id="5" name="Picture 4"/>
+          <p:cNvPr id="4" name="Picture 3"/>
           <p:cNvPicPr>
             <a:picLocks noChangeAspect="1"/>
           </p:cNvPicPr>
@@ -4793,13 +4928,13 @@
               </a:ext>
             </a:extLst>
           </a:blip>
-          <a:srcRect l="5322" r="21206" b="9213"/>
+          <a:srcRect l="4901" r="18295" b="9805"/>
           <a:stretch/>
         </p:blipFill>
         <p:spPr>
           <a:xfrm>
-            <a:off x="685799" y="1153564"/>
-            <a:ext cx="9544413" cy="5158336"/>
+            <a:off x="635000" y="1153564"/>
+            <a:ext cx="9633313" cy="5130799"/>
           </a:xfrm>
           <a:prstGeom prst="rect">
             <a:avLst/>
@@ -4808,7 +4943,7 @@
       </p:pic>
       <p:pic>
         <p:nvPicPr>
-          <p:cNvPr id="13" name="Picture 12"/>
+          <p:cNvPr id="5" name="Picture 4"/>
           <p:cNvPicPr>
             <a:picLocks noChangeAspect="1"/>
           </p:cNvPicPr>
@@ -4832,13 +4967,13 @@
               </a:ext>
             </a:extLst>
           </a:blip>
-          <a:srcRect r="19793"/>
+          <a:srcRect l="5322" r="21206" b="9213"/>
           <a:stretch/>
         </p:blipFill>
         <p:spPr>
           <a:xfrm>
-            <a:off x="0" y="1153983"/>
-            <a:ext cx="10293713" cy="5704017"/>
+            <a:off x="685799" y="1153564"/>
+            <a:ext cx="9544413" cy="5158336"/>
           </a:xfrm>
           <a:prstGeom prst="rect">
             <a:avLst/>
@@ -4898,7 +5033,7 @@
           <p:nvPr/>
         </p:nvPicPr>
         <p:blipFill rotWithShape="1">
-          <a:blip r:embed="rId3">
+          <a:blip r:embed="rId4">
             <a:extLst>
               <a:ext uri="{28A0092B-C50C-407E-A947-70E740481C1C}">
                 <a14:useLocalDpi xmlns:a14="http://schemas.microsoft.com/office/drawing/2010/main" val="0"/>
@@ -5017,7 +5152,7 @@
           <p:nvPr/>
         </p:nvPicPr>
         <p:blipFill rotWithShape="1">
-          <a:blip r:embed="rId2">
+          <a:blip r:embed="rId3">
             <a:clrChange>
               <a:clrFrom>
                 <a:srgbClr val="FFFFFF"/>
@@ -5056,7 +5191,7 @@
           <p:nvPr/>
         </p:nvPicPr>
         <p:blipFill rotWithShape="1">
-          <a:blip r:embed="rId4">
+          <a:blip r:embed="rId2">
             <a:extLst>
               <a:ext uri="{28A0092B-C50C-407E-A947-70E740481C1C}">
                 <a14:useLocalDpi xmlns:a14="http://schemas.microsoft.com/office/drawing/2010/main" val="0"/>
@@ -5303,10 +5438,18 @@
           <a:p>
             <a:r>
               <a:rPr lang="en-US" dirty="0" smtClean="0"/>
-              <a:t>At a property level, birds begin to select for BF in the spring,  yet are still selecting against it at both </a:t>
-            </a:r>
-            <a:r>
-              <a:rPr lang="en-US" dirty="0" err="1" smtClean="0"/>
+              <a:t>At a </a:t>
+            </a:r>
+            <a:r>
+              <a:rPr lang="en-US" b="1" u="sng" dirty="0" smtClean="0"/>
+              <a:t>property</a:t>
+            </a:r>
+            <a:r>
+              <a:rPr lang="en-US" dirty="0" smtClean="0"/>
+              <a:t> level, birds begin to select for BF in the spring,  yet are still selecting against it at both </a:t>
+            </a:r>
+            <a:r>
+              <a:rPr lang="en-US" b="1" u="sng" dirty="0" err="1" smtClean="0"/>
               <a:t>homerange</a:t>
             </a:r>
             <a:r>
@@ -5362,8 +5505,8 @@
         </p:nvCxnSpPr>
         <p:spPr>
           <a:xfrm flipV="1">
-            <a:off x="2934708" y="3869142"/>
-            <a:ext cx="965963" cy="1467061"/>
+            <a:off x="2457450" y="3869143"/>
+            <a:ext cx="1443221" cy="1321919"/>
           </a:xfrm>
           <a:prstGeom prst="straightConnector1">
             <a:avLst/>
@@ -5747,7 +5890,7 @@
       </p:grpSpPr>
       <p:pic>
         <p:nvPicPr>
-          <p:cNvPr id="5" name="Picture 4"/>
+          <p:cNvPr id="7" name="Picture 6"/>
           <p:cNvPicPr>
             <a:picLocks noChangeAspect="1"/>
           </p:cNvPicPr>
@@ -5771,13 +5914,13 @@
               </a:ext>
             </a:extLst>
           </a:blip>
-          <a:srcRect l="5470" r="25503" b="9213"/>
+          <a:srcRect l="5414" r="19189" b="10006"/>
           <a:stretch/>
         </p:blipFill>
         <p:spPr>
           <a:xfrm>
-            <a:off x="787400" y="989554"/>
-            <a:ext cx="9398000" cy="5487446"/>
+            <a:off x="841076" y="985183"/>
+            <a:ext cx="9344324" cy="5441017"/>
           </a:xfrm>
           <a:prstGeom prst="rect">
             <a:avLst/>
@@ -5786,7 +5929,7 @@
       </p:pic>
       <p:pic>
         <p:nvPicPr>
-          <p:cNvPr id="7" name="Picture 6"/>
+          <p:cNvPr id="4" name="Picture 3"/>
           <p:cNvPicPr>
             <a:picLocks noChangeAspect="1"/>
           </p:cNvPicPr>
@@ -5810,13 +5953,13 @@
               </a:ext>
             </a:extLst>
           </a:blip>
-          <a:srcRect l="5414" r="19189" b="10006"/>
+          <a:srcRect r="27666"/>
           <a:stretch/>
         </p:blipFill>
         <p:spPr>
           <a:xfrm>
-            <a:off x="841076" y="985183"/>
-            <a:ext cx="9344324" cy="5441017"/>
+            <a:off x="0" y="959783"/>
+            <a:ext cx="10274300" cy="6099562"/>
           </a:xfrm>
           <a:prstGeom prst="rect">
             <a:avLst/>
@@ -5825,7 +5968,7 @@
       </p:pic>
       <p:pic>
         <p:nvPicPr>
-          <p:cNvPr id="4" name="Picture 3"/>
+          <p:cNvPr id="5" name="Picture 4"/>
           <p:cNvPicPr>
             <a:picLocks noChangeAspect="1"/>
           </p:cNvPicPr>
@@ -5849,13 +5992,13 @@
               </a:ext>
             </a:extLst>
           </a:blip>
-          <a:srcRect r="27666"/>
+          <a:srcRect l="5470" r="25503" b="9213"/>
           <a:stretch/>
         </p:blipFill>
         <p:spPr>
           <a:xfrm>
-            <a:off x="0" y="959783"/>
-            <a:ext cx="10274300" cy="6099562"/>
+            <a:off x="787400" y="989554"/>
+            <a:ext cx="9398000" cy="5487446"/>
           </a:xfrm>
           <a:prstGeom prst="rect">
             <a:avLst/>
@@ -5909,6 +6052,45 @@
       <p:pic>
         <p:nvPicPr>
           <p:cNvPr id="6" name="Picture 5"/>
+          <p:cNvPicPr>
+            <a:picLocks noChangeAspect="1"/>
+          </p:cNvPicPr>
+          <p:nvPr/>
+        </p:nvPicPr>
+        <p:blipFill rotWithShape="1">
+          <a:blip r:embed="rId4">
+            <a:clrChange>
+              <a:clrFrom>
+                <a:srgbClr val="FFFFFF"/>
+              </a:clrFrom>
+              <a:clrTo>
+                <a:srgbClr val="FFFFFF">
+                  <a:alpha val="0"/>
+                </a:srgbClr>
+              </a:clrTo>
+            </a:clrChange>
+            <a:extLst>
+              <a:ext uri="{28A0092B-C50C-407E-A947-70E740481C1C}">
+                <a14:useLocalDpi xmlns:a14="http://schemas.microsoft.com/office/drawing/2010/main" val="0"/>
+              </a:ext>
+            </a:extLst>
+          </a:blip>
+          <a:srcRect l="74793" t="29824" r="11994" b="29568"/>
+          <a:stretch/>
+        </p:blipFill>
+        <p:spPr>
+          <a:xfrm>
+            <a:off x="10239076" y="4838700"/>
+            <a:ext cx="1254424" cy="2019300"/>
+          </a:xfrm>
+          <a:prstGeom prst="rect">
+            <a:avLst/>
+          </a:prstGeom>
+        </p:spPr>
+      </p:pic>
+      <p:pic>
+        <p:nvPicPr>
+          <p:cNvPr id="8" name="Picture 7"/>
           <p:cNvPicPr>
             <a:picLocks noChangeAspect="1"/>
           </p:cNvPicPr>
@@ -5932,45 +6114,6 @@
               </a:ext>
             </a:extLst>
           </a:blip>
-          <a:srcRect l="74793" t="29824" r="11994" b="29568"/>
-          <a:stretch/>
-        </p:blipFill>
-        <p:spPr>
-          <a:xfrm>
-            <a:off x="10239076" y="4838700"/>
-            <a:ext cx="1254424" cy="2019300"/>
-          </a:xfrm>
-          <a:prstGeom prst="rect">
-            <a:avLst/>
-          </a:prstGeom>
-        </p:spPr>
-      </p:pic>
-      <p:pic>
-        <p:nvPicPr>
-          <p:cNvPr id="8" name="Picture 7"/>
-          <p:cNvPicPr>
-            <a:picLocks noChangeAspect="1"/>
-          </p:cNvPicPr>
-          <p:nvPr/>
-        </p:nvPicPr>
-        <p:blipFill rotWithShape="1">
-          <a:blip r:embed="rId3">
-            <a:clrChange>
-              <a:clrFrom>
-                <a:srgbClr val="FFFFFF"/>
-              </a:clrFrom>
-              <a:clrTo>
-                <a:srgbClr val="FFFFFF">
-                  <a:alpha val="0"/>
-                </a:srgbClr>
-              </a:clrTo>
-            </a:clrChange>
-            <a:extLst>
-              <a:ext uri="{28A0092B-C50C-407E-A947-70E740481C1C}">
-                <a14:useLocalDpi xmlns:a14="http://schemas.microsoft.com/office/drawing/2010/main" val="0"/>
-              </a:ext>
-            </a:extLst>
-          </a:blip>
           <a:srcRect l="80959" t="30298" r="674" b="33336"/>
           <a:stretch/>
         </p:blipFill>
@@ -5993,7 +6136,7 @@
           <p:nvPr/>
         </p:nvPicPr>
         <p:blipFill rotWithShape="1">
-          <a:blip r:embed="rId4">
+          <a:blip r:embed="rId3">
             <a:clrChange>
               <a:clrFrom>
                 <a:srgbClr val="FFFFFF"/>

</xml_diff>